<commit_message>
redone jane analysis and figure
</commit_message>
<xml_diff>
--- a/jane_coevolution_analysis/jane_phylogeny_images.pptx
+++ b/jane_coevolution_analysis/jane_phylogeny_images.pptx
@@ -5,11 +5,10 @@
     <p:sldMasterId id="2147483648" r:id="rId1"/>
   </p:sldMasterIdLst>
   <p:notesMasterIdLst>
-    <p:notesMasterId r:id="rId4"/>
+    <p:notesMasterId r:id="rId3"/>
   </p:notesMasterIdLst>
   <p:sldIdLst>
     <p:sldId id="256" r:id="rId2"/>
-    <p:sldId id="257" r:id="rId3"/>
   </p:sldIdLst>
   <p:sldSz cx="12192000" cy="6858000"/>
   <p:notesSz cx="6858000" cy="9144000"/>
@@ -540,114 +539,6 @@
     <p:extLst>
       <p:ext uri="{BB962C8B-B14F-4D97-AF65-F5344CB8AC3E}">
         <p14:creationId xmlns:p14="http://schemas.microsoft.com/office/powerpoint/2010/main" val="2799793506"/>
-      </p:ext>
-    </p:extLst>
-  </p:cSld>
-  <p:clrMapOvr>
-    <a:masterClrMapping/>
-  </p:clrMapOvr>
-</p:notes>
-</file>
-
-<file path=ppt/notesSlides/notesSlide2.xml><?xml version="1.0" encoding="utf-8"?>
-<p:notes xmlns:a="http://schemas.openxmlformats.org/drawingml/2006/main" xmlns:r="http://schemas.openxmlformats.org/officeDocument/2006/relationships" xmlns:p="http://schemas.openxmlformats.org/presentationml/2006/main">
-  <p:cSld>
-    <p:spTree>
-      <p:nvGrpSpPr>
-        <p:cNvPr id="1" name="">
-          <a:extLst>
-            <a:ext uri="{FF2B5EF4-FFF2-40B4-BE49-F238E27FC236}">
-              <a16:creationId xmlns:a16="http://schemas.microsoft.com/office/drawing/2014/main" id="{1446A229-32DD-A8B3-968A-C694BB8BA981}"/>
-            </a:ext>
-          </a:extLst>
-        </p:cNvPr>
-        <p:cNvGrpSpPr/>
-        <p:nvPr/>
-      </p:nvGrpSpPr>
-      <p:grpSpPr>
-        <a:xfrm>
-          <a:off x="0" y="0"/>
-          <a:ext cx="0" cy="0"/>
-          <a:chOff x="0" y="0"/>
-          <a:chExt cx="0" cy="0"/>
-        </a:xfrm>
-      </p:grpSpPr>
-      <p:sp>
-        <p:nvSpPr>
-          <p:cNvPr id="2" name="Slide Image Placeholder 1">
-            <a:extLst>
-              <a:ext uri="{FF2B5EF4-FFF2-40B4-BE49-F238E27FC236}">
-                <a16:creationId xmlns:a16="http://schemas.microsoft.com/office/drawing/2014/main" id="{09F99849-9B8B-6B53-5602-63CF01D405A9}"/>
-              </a:ext>
-            </a:extLst>
-          </p:cNvPr>
-          <p:cNvSpPr>
-            <a:spLocks noGrp="1" noRot="1" noChangeAspect="1"/>
-          </p:cNvSpPr>
-          <p:nvPr>
-            <p:ph type="sldImg"/>
-          </p:nvPr>
-        </p:nvSpPr>
-        <p:spPr/>
-      </p:sp>
-      <p:sp>
-        <p:nvSpPr>
-          <p:cNvPr id="3" name="Notes Placeholder 2">
-            <a:extLst>
-              <a:ext uri="{FF2B5EF4-FFF2-40B4-BE49-F238E27FC236}">
-                <a16:creationId xmlns:a16="http://schemas.microsoft.com/office/drawing/2014/main" id="{57B91A04-7EC8-42BE-C343-4474E6437E3B}"/>
-              </a:ext>
-            </a:extLst>
-          </p:cNvPr>
-          <p:cNvSpPr>
-            <a:spLocks noGrp="1"/>
-          </p:cNvSpPr>
-          <p:nvPr>
-            <p:ph type="body" idx="1"/>
-          </p:nvPr>
-        </p:nvSpPr>
-        <p:spPr/>
-        <p:txBody>
-          <a:bodyPr/>
-          <a:lstStyle/>
-          <a:p>
-            <a:endParaRPr lang="en-US" dirty="0"/>
-          </a:p>
-        </p:txBody>
-      </p:sp>
-      <p:sp>
-        <p:nvSpPr>
-          <p:cNvPr id="4" name="Slide Number Placeholder 3">
-            <a:extLst>
-              <a:ext uri="{FF2B5EF4-FFF2-40B4-BE49-F238E27FC236}">
-                <a16:creationId xmlns:a16="http://schemas.microsoft.com/office/drawing/2014/main" id="{600D77BF-7CED-20DF-6680-9BE2224DF457}"/>
-              </a:ext>
-            </a:extLst>
-          </p:cNvPr>
-          <p:cNvSpPr>
-            <a:spLocks noGrp="1"/>
-          </p:cNvSpPr>
-          <p:nvPr>
-            <p:ph type="sldNum" sz="quarter" idx="5"/>
-          </p:nvPr>
-        </p:nvSpPr>
-        <p:spPr/>
-        <p:txBody>
-          <a:bodyPr/>
-          <a:lstStyle/>
-          <a:p>
-            <a:fld id="{FF0E4DF5-AF14-5A42-885C-FB0C47948090}" type="slidenum">
-              <a:rPr lang="en-US" smtClean="0"/>
-              <a:t>2</a:t>
-            </a:fld>
-            <a:endParaRPr lang="en-US"/>
-          </a:p>
-        </p:txBody>
-      </p:sp>
-    </p:spTree>
-    <p:extLst>
-      <p:ext uri="{BB962C8B-B14F-4D97-AF65-F5344CB8AC3E}">
-        <p14:creationId xmlns:p14="http://schemas.microsoft.com/office/powerpoint/2010/main" val="2424233183"/>
       </p:ext>
     </p:extLst>
   </p:cSld>
@@ -3873,10 +3764,10 @@
       </p:grpSpPr>
       <p:grpSp>
         <p:nvGrpSpPr>
-          <p:cNvPr id="25" name="Group 24">
-            <a:extLst>
-              <a:ext uri="{FF2B5EF4-FFF2-40B4-BE49-F238E27FC236}">
-                <a16:creationId xmlns:a16="http://schemas.microsoft.com/office/drawing/2014/main" id="{16CEA4CA-F436-A428-E250-1F0ECA917FE6}"/>
+          <p:cNvPr id="53" name="Group 52">
+            <a:extLst>
+              <a:ext uri="{FF2B5EF4-FFF2-40B4-BE49-F238E27FC236}">
+                <a16:creationId xmlns:a16="http://schemas.microsoft.com/office/drawing/2014/main" id="{2BC05F9D-2884-F970-BD6B-4CECA6E2A0F6}"/>
               </a:ext>
             </a:extLst>
           </p:cNvPr>
@@ -3885,18 +3776,70 @@
         </p:nvGrpSpPr>
         <p:grpSpPr>
           <a:xfrm>
-            <a:off x="1854500" y="222004"/>
-            <a:ext cx="9473900" cy="6271658"/>
-            <a:chOff x="1854500" y="222004"/>
-            <a:chExt cx="9473900" cy="6271658"/>
+            <a:off x="0" y="0"/>
+            <a:ext cx="12192000" cy="6858000"/>
+            <a:chOff x="0" y="0"/>
+            <a:chExt cx="12192000" cy="6858000"/>
           </a:xfrm>
         </p:grpSpPr>
+        <p:sp>
+          <p:nvSpPr>
+            <p:cNvPr id="52" name="Rectangle 51">
+              <a:extLst>
+                <a:ext uri="{FF2B5EF4-FFF2-40B4-BE49-F238E27FC236}">
+                  <a16:creationId xmlns:a16="http://schemas.microsoft.com/office/drawing/2014/main" id="{C2C6868F-9316-572A-3F43-309FFB76B6B2}"/>
+                </a:ext>
+              </a:extLst>
+            </p:cNvPr>
+            <p:cNvSpPr/>
+            <p:nvPr/>
+          </p:nvSpPr>
+          <p:spPr>
+            <a:xfrm>
+              <a:off x="0" y="0"/>
+              <a:ext cx="12192000" cy="6858000"/>
+            </a:xfrm>
+            <a:prstGeom prst="rect">
+              <a:avLst/>
+            </a:prstGeom>
+            <a:solidFill>
+              <a:schemeClr val="bg1"/>
+            </a:solidFill>
+            <a:ln>
+              <a:noFill/>
+            </a:ln>
+          </p:spPr>
+          <p:style>
+            <a:lnRef idx="2">
+              <a:schemeClr val="accent1">
+                <a:shade val="15000"/>
+              </a:schemeClr>
+            </a:lnRef>
+            <a:fillRef idx="1">
+              <a:schemeClr val="accent1"/>
+            </a:fillRef>
+            <a:effectRef idx="0">
+              <a:schemeClr val="accent1"/>
+            </a:effectRef>
+            <a:fontRef idx="minor">
+              <a:schemeClr val="lt1"/>
+            </a:fontRef>
+          </p:style>
+          <p:txBody>
+            <a:bodyPr rtlCol="0" anchor="ctr"/>
+            <a:lstStyle/>
+            <a:p>
+              <a:pPr algn="ctr"/>
+              <a:endParaRPr lang="en-US"/>
+            </a:p>
+          </p:txBody>
+        </p:sp>
         <p:grpSp>
           <p:nvGrpSpPr>
-            <p:cNvPr id="17" name="Group 16">
+            <p:cNvPr id="51" name="Group 50">
               <a:extLst>
                 <a:ext uri="{FF2B5EF4-FFF2-40B4-BE49-F238E27FC236}">
-                  <a16:creationId xmlns:a16="http://schemas.microsoft.com/office/drawing/2014/main" id="{18DDA138-FAF9-9846-6D61-DEDD4147C106}"/>
+                  <a16:creationId xmlns:a16="http://schemas.microsoft.com/office/drawing/2014/main" id="{D2C3042C-ECD3-F372-AB27-1A3B4B94C5E9}"/>
                 </a:ext>
               </a:extLst>
             </p:cNvPr>
@@ -3905,477 +3848,463 @@
           </p:nvGrpSpPr>
           <p:grpSpPr>
             <a:xfrm>
-              <a:off x="1854500" y="222004"/>
-              <a:ext cx="9473900" cy="6271658"/>
-              <a:chOff x="1854500" y="222004"/>
-              <a:chExt cx="9473900" cy="6271658"/>
+              <a:off x="222069" y="260293"/>
+              <a:ext cx="11730445" cy="6336452"/>
+              <a:chOff x="-5667" y="-27093"/>
+              <a:chExt cx="12106017" cy="6138457"/>
             </a:xfrm>
           </p:grpSpPr>
-          <p:grpSp>
-            <p:nvGrpSpPr>
-              <p:cNvPr id="22" name="Group 21">
+          <p:pic>
+            <p:nvPicPr>
+              <p:cNvPr id="5" name="Picture 4" descr="A computer screen shot of a computer&#10;&#10;AI-generated content may be incorrect.">
                 <a:extLst>
                   <a:ext uri="{FF2B5EF4-FFF2-40B4-BE49-F238E27FC236}">
-                    <a16:creationId xmlns:a16="http://schemas.microsoft.com/office/drawing/2014/main" id="{CE6B42C5-A40B-AB5F-5B21-2945EB092727}"/>
+                    <a16:creationId xmlns:a16="http://schemas.microsoft.com/office/drawing/2014/main" id="{158BAD4D-649E-AD65-DFC4-4869C5E2365B}"/>
                   </a:ext>
                 </a:extLst>
               </p:cNvPr>
-              <p:cNvGrpSpPr/>
+              <p:cNvPicPr>
+                <a:picLocks noChangeAspect="1"/>
+              </p:cNvPicPr>
               <p:nvPr/>
-            </p:nvGrpSpPr>
-            <p:grpSpPr>
+            </p:nvPicPr>
+            <p:blipFill>
+              <a:blip r:embed="rId3"/>
+              <a:srcRect r="79501" b="4409"/>
+              <a:stretch>
+                <a:fillRect/>
+              </a:stretch>
+            </p:blipFill>
+            <p:spPr>
               <a:xfrm>
-                <a:off x="1854500" y="222004"/>
-                <a:ext cx="9473900" cy="6271658"/>
-                <a:chOff x="1854500" y="222004"/>
-                <a:chExt cx="9473900" cy="6271658"/>
+                <a:off x="11278423" y="1828279"/>
+                <a:ext cx="821927" cy="2926746"/>
               </a:xfrm>
-            </p:grpSpPr>
-            <p:sp>
-              <p:nvSpPr>
-                <p:cNvPr id="21" name="Rectangle 20">
-                  <a:extLst>
-                    <a:ext uri="{FF2B5EF4-FFF2-40B4-BE49-F238E27FC236}">
-                      <a16:creationId xmlns:a16="http://schemas.microsoft.com/office/drawing/2014/main" id="{B6465E69-0AF2-41B7-F597-54AA8E730213}"/>
-                    </a:ext>
-                  </a:extLst>
-                </p:cNvPr>
-                <p:cNvSpPr/>
-                <p:nvPr/>
-              </p:nvSpPr>
-              <p:spPr>
-                <a:xfrm>
-                  <a:off x="1854500" y="222004"/>
-                  <a:ext cx="9473900" cy="6271658"/>
-                </a:xfrm>
-                <a:prstGeom prst="rect">
-                  <a:avLst/>
-                </a:prstGeom>
-                <a:solidFill>
-                  <a:schemeClr val="bg1"/>
-                </a:solidFill>
-                <a:ln>
-                  <a:solidFill>
-                    <a:schemeClr val="bg1"/>
-                  </a:solidFill>
-                </a:ln>
-              </p:spPr>
-              <p:style>
-                <a:lnRef idx="2">
-                  <a:schemeClr val="accent1">
-                    <a:shade val="15000"/>
-                  </a:schemeClr>
-                </a:lnRef>
-                <a:fillRef idx="1">
-                  <a:schemeClr val="accent1"/>
-                </a:fillRef>
-                <a:effectRef idx="0">
-                  <a:schemeClr val="accent1"/>
-                </a:effectRef>
-                <a:fontRef idx="minor">
-                  <a:schemeClr val="lt1"/>
-                </a:fontRef>
-              </p:style>
-              <p:txBody>
-                <a:bodyPr rtlCol="0" anchor="ctr"/>
-                <a:lstStyle/>
-                <a:p>
-                  <a:pPr algn="ctr"/>
-                  <a:endParaRPr lang="en-US"/>
-                </a:p>
-              </p:txBody>
-            </p:sp>
-            <p:pic>
-              <p:nvPicPr>
-                <p:cNvPr id="5" name="Picture 4" descr="A computer screen shot of a computer&#10;&#10;AI-generated content may be incorrect.">
-                  <a:extLst>
-                    <a:ext uri="{FF2B5EF4-FFF2-40B4-BE49-F238E27FC236}">
-                      <a16:creationId xmlns:a16="http://schemas.microsoft.com/office/drawing/2014/main" id="{158BAD4D-649E-AD65-DFC4-4869C5E2365B}"/>
-                    </a:ext>
-                  </a:extLst>
-                </p:cNvPr>
-                <p:cNvPicPr>
-                  <a:picLocks noChangeAspect="1"/>
-                </p:cNvPicPr>
-                <p:nvPr/>
-              </p:nvPicPr>
-              <p:blipFill>
-                <a:blip r:embed="rId3"/>
-                <a:srcRect r="79501" b="4409"/>
-                <a:stretch>
-                  <a:fillRect/>
-                </a:stretch>
-              </p:blipFill>
-              <p:spPr>
-                <a:xfrm>
-                  <a:off x="10214593" y="1711397"/>
-                  <a:ext cx="992101" cy="3532708"/>
-                </a:xfrm>
-                <a:prstGeom prst="rect">
-                  <a:avLst/>
-                </a:prstGeom>
-              </p:spPr>
-            </p:pic>
-            <p:pic>
-              <p:nvPicPr>
-                <p:cNvPr id="9" name="Picture 8" descr="A computer screen shot of a black background&#10;&#10;AI-generated content may be incorrect.">
-                  <a:extLst>
-                    <a:ext uri="{FF2B5EF4-FFF2-40B4-BE49-F238E27FC236}">
-                      <a16:creationId xmlns:a16="http://schemas.microsoft.com/office/drawing/2014/main" id="{53061F66-16B0-E107-8586-CFA1CD8D54D8}"/>
-                    </a:ext>
-                  </a:extLst>
-                </p:cNvPr>
-                <p:cNvPicPr>
-                  <a:picLocks noChangeAspect="1"/>
-                </p:cNvPicPr>
-                <p:nvPr/>
-              </p:nvPicPr>
-              <p:blipFill>
-                <a:blip r:embed="rId4"/>
-                <a:srcRect l="20471" t="12664" r="-141" b="12664"/>
-                <a:stretch>
-                  <a:fillRect/>
-                </a:stretch>
-              </p:blipFill>
-              <p:spPr>
-                <a:xfrm>
-                  <a:off x="6466097" y="625851"/>
-                  <a:ext cx="3448734" cy="2468332"/>
-                </a:xfrm>
-                <a:prstGeom prst="rect">
-                  <a:avLst/>
-                </a:prstGeom>
-              </p:spPr>
-            </p:pic>
-            <p:pic>
-              <p:nvPicPr>
-                <p:cNvPr id="11" name="Picture 10" descr="A computer screen shot of a black background&#10;&#10;AI-generated content may be incorrect.">
-                  <a:extLst>
-                    <a:ext uri="{FF2B5EF4-FFF2-40B4-BE49-F238E27FC236}">
-                      <a16:creationId xmlns:a16="http://schemas.microsoft.com/office/drawing/2014/main" id="{926C00AB-4FFB-0C14-47F6-67D770417418}"/>
-                    </a:ext>
-                  </a:extLst>
-                </p:cNvPr>
-                <p:cNvPicPr>
-                  <a:picLocks noChangeAspect="1"/>
-                </p:cNvPicPr>
-                <p:nvPr/>
-              </p:nvPicPr>
-              <p:blipFill>
-                <a:blip r:embed="rId5"/>
-                <a:srcRect l="20519" t="10279" b="12823"/>
-                <a:stretch>
-                  <a:fillRect/>
-                </a:stretch>
-              </p:blipFill>
-              <p:spPr>
-                <a:xfrm>
-                  <a:off x="2304879" y="3618837"/>
-                  <a:ext cx="3246818" cy="2398808"/>
-                </a:xfrm>
-                <a:prstGeom prst="rect">
-                  <a:avLst/>
-                </a:prstGeom>
-              </p:spPr>
-            </p:pic>
-            <p:pic>
-              <p:nvPicPr>
-                <p:cNvPr id="13" name="Picture 12" descr="A computer screen shot of a black background&#10;&#10;AI-generated content may be incorrect.">
-                  <a:extLst>
-                    <a:ext uri="{FF2B5EF4-FFF2-40B4-BE49-F238E27FC236}">
-                      <a16:creationId xmlns:a16="http://schemas.microsoft.com/office/drawing/2014/main" id="{CBB02395-1505-C64D-E2D4-96EA7753EED2}"/>
-                    </a:ext>
-                  </a:extLst>
-                </p:cNvPr>
-                <p:cNvPicPr>
-                  <a:picLocks noChangeAspect="1"/>
-                </p:cNvPicPr>
-                <p:nvPr/>
-              </p:nvPicPr>
-              <p:blipFill>
-                <a:blip r:embed="rId6"/>
-                <a:srcRect l="20455" t="5403" b="7714"/>
-                <a:stretch>
-                  <a:fillRect/>
-                </a:stretch>
-              </p:blipFill>
-              <p:spPr>
-                <a:xfrm>
-                  <a:off x="6468101" y="3618837"/>
-                  <a:ext cx="3446727" cy="2874825"/>
-                </a:xfrm>
-                <a:prstGeom prst="rect">
-                  <a:avLst/>
-                </a:prstGeom>
-              </p:spPr>
-            </p:pic>
-            <p:sp>
-              <p:nvSpPr>
-                <p:cNvPr id="14" name="TextBox 13">
-                  <a:extLst>
-                    <a:ext uri="{FF2B5EF4-FFF2-40B4-BE49-F238E27FC236}">
-                      <a16:creationId xmlns:a16="http://schemas.microsoft.com/office/drawing/2014/main" id="{5AF827EB-5DE1-4CA9-B83D-61AEF956A472}"/>
-                    </a:ext>
-                  </a:extLst>
-                </p:cNvPr>
-                <p:cNvSpPr txBox="1"/>
-                <p:nvPr/>
-              </p:nvSpPr>
-              <p:spPr>
-                <a:xfrm>
-                  <a:off x="1854500" y="222004"/>
-                  <a:ext cx="367408" cy="446276"/>
-                </a:xfrm>
-                <a:prstGeom prst="rect">
-                  <a:avLst/>
-                </a:prstGeom>
-                <a:noFill/>
-              </p:spPr>
-              <p:txBody>
-                <a:bodyPr wrap="none" rtlCol="0">
-                  <a:spAutoFit/>
-                </a:bodyPr>
-                <a:lstStyle/>
-                <a:p>
-                  <a:r>
-                    <a:rPr lang="en-US" sz="2300" b="1" dirty="0">
-                      <a:latin typeface="Calibri" panose="020F0502020204030204" pitchFamily="34" charset="0"/>
-                      <a:cs typeface="Calibri" panose="020F0502020204030204" pitchFamily="34" charset="0"/>
-                    </a:rPr>
-                    <a:t>A</a:t>
-                  </a:r>
-                </a:p>
-              </p:txBody>
-            </p:sp>
-            <p:sp>
-              <p:nvSpPr>
-                <p:cNvPr id="15" name="Rectangle 14">
-                  <a:extLst>
-                    <a:ext uri="{FF2B5EF4-FFF2-40B4-BE49-F238E27FC236}">
-                      <a16:creationId xmlns:a16="http://schemas.microsoft.com/office/drawing/2014/main" id="{02369B17-A867-29DF-A63C-D10B752E40B3}"/>
-                    </a:ext>
-                  </a:extLst>
-                </p:cNvPr>
-                <p:cNvSpPr/>
-                <p:nvPr/>
-              </p:nvSpPr>
-              <p:spPr>
-                <a:xfrm>
-                  <a:off x="6096000" y="3562350"/>
-                  <a:ext cx="370096" cy="2931312"/>
-                </a:xfrm>
-                <a:prstGeom prst="rect">
-                  <a:avLst/>
-                </a:prstGeom>
-                <a:solidFill>
-                  <a:schemeClr val="bg1"/>
-                </a:solidFill>
-                <a:ln>
-                  <a:solidFill>
-                    <a:schemeClr val="bg1"/>
-                  </a:solidFill>
-                </a:ln>
-              </p:spPr>
-              <p:style>
-                <a:lnRef idx="2">
-                  <a:schemeClr val="accent1">
-                    <a:shade val="15000"/>
-                  </a:schemeClr>
-                </a:lnRef>
-                <a:fillRef idx="1">
-                  <a:schemeClr val="accent1"/>
-                </a:fillRef>
-                <a:effectRef idx="0">
-                  <a:schemeClr val="accent1"/>
-                </a:effectRef>
-                <a:fontRef idx="minor">
-                  <a:schemeClr val="lt1"/>
-                </a:fontRef>
-              </p:style>
-              <p:txBody>
-                <a:bodyPr rtlCol="0" anchor="ctr"/>
-                <a:lstStyle/>
-                <a:p>
-                  <a:pPr algn="ctr"/>
-                  <a:endParaRPr lang="en-US"/>
-                </a:p>
-              </p:txBody>
-            </p:sp>
-            <p:sp>
-              <p:nvSpPr>
-                <p:cNvPr id="16" name="Rectangle 15">
-                  <a:extLst>
-                    <a:ext uri="{FF2B5EF4-FFF2-40B4-BE49-F238E27FC236}">
-                      <a16:creationId xmlns:a16="http://schemas.microsoft.com/office/drawing/2014/main" id="{178EBF40-48E5-097F-1468-141ED4A46AFF}"/>
-                    </a:ext>
-                  </a:extLst>
-                </p:cNvPr>
-                <p:cNvSpPr/>
-                <p:nvPr/>
-              </p:nvSpPr>
-              <p:spPr>
-                <a:xfrm>
-                  <a:off x="6100595" y="668280"/>
-                  <a:ext cx="370096" cy="2931312"/>
-                </a:xfrm>
-                <a:prstGeom prst="rect">
-                  <a:avLst/>
-                </a:prstGeom>
-                <a:solidFill>
-                  <a:schemeClr val="bg1"/>
-                </a:solidFill>
-                <a:ln>
-                  <a:solidFill>
-                    <a:schemeClr val="bg1"/>
-                  </a:solidFill>
-                </a:ln>
-              </p:spPr>
-              <p:style>
-                <a:lnRef idx="2">
-                  <a:schemeClr val="accent1">
-                    <a:shade val="15000"/>
-                  </a:schemeClr>
-                </a:lnRef>
-                <a:fillRef idx="1">
-                  <a:schemeClr val="accent1"/>
-                </a:fillRef>
-                <a:effectRef idx="0">
-                  <a:schemeClr val="accent1"/>
-                </a:effectRef>
-                <a:fontRef idx="minor">
-                  <a:schemeClr val="lt1"/>
-                </a:fontRef>
-              </p:style>
-              <p:txBody>
-                <a:bodyPr rtlCol="0" anchor="ctr"/>
-                <a:lstStyle/>
-                <a:p>
-                  <a:pPr algn="ctr"/>
-                  <a:endParaRPr lang="en-US"/>
-                </a:p>
-              </p:txBody>
-            </p:sp>
-            <p:sp>
-              <p:nvSpPr>
-                <p:cNvPr id="18" name="TextBox 17">
-                  <a:extLst>
-                    <a:ext uri="{FF2B5EF4-FFF2-40B4-BE49-F238E27FC236}">
-                      <a16:creationId xmlns:a16="http://schemas.microsoft.com/office/drawing/2014/main" id="{C6D3F68E-BCD5-BDF0-892A-B04E5EB8EF64}"/>
-                    </a:ext>
-                  </a:extLst>
-                </p:cNvPr>
-                <p:cNvSpPr txBox="1"/>
-                <p:nvPr/>
-              </p:nvSpPr>
-              <p:spPr>
-                <a:xfrm>
-                  <a:off x="6125510" y="222004"/>
-                  <a:ext cx="349776" cy="446276"/>
-                </a:xfrm>
-                <a:prstGeom prst="rect">
-                  <a:avLst/>
-                </a:prstGeom>
-                <a:noFill/>
-              </p:spPr>
-              <p:txBody>
-                <a:bodyPr wrap="none" rtlCol="0">
-                  <a:spAutoFit/>
-                </a:bodyPr>
-                <a:lstStyle/>
-                <a:p>
-                  <a:r>
-                    <a:rPr lang="en-US" sz="2300" b="1" dirty="0">
-                      <a:latin typeface="Calibri" panose="020F0502020204030204" pitchFamily="34" charset="0"/>
-                      <a:cs typeface="Calibri" panose="020F0502020204030204" pitchFamily="34" charset="0"/>
-                    </a:rPr>
-                    <a:t>B</a:t>
-                  </a:r>
-                </a:p>
-              </p:txBody>
-            </p:sp>
-            <p:sp>
-              <p:nvSpPr>
-                <p:cNvPr id="19" name="TextBox 18">
-                  <a:extLst>
-                    <a:ext uri="{FF2B5EF4-FFF2-40B4-BE49-F238E27FC236}">
-                      <a16:creationId xmlns:a16="http://schemas.microsoft.com/office/drawing/2014/main" id="{C974FD7A-413C-F7EE-A654-9966A107C05B}"/>
-                    </a:ext>
-                  </a:extLst>
-                </p:cNvPr>
-                <p:cNvSpPr txBox="1"/>
-                <p:nvPr/>
-              </p:nvSpPr>
-              <p:spPr>
-                <a:xfrm>
-                  <a:off x="1854500" y="3172561"/>
-                  <a:ext cx="340158" cy="446276"/>
-                </a:xfrm>
-                <a:prstGeom prst="rect">
-                  <a:avLst/>
-                </a:prstGeom>
-                <a:noFill/>
-              </p:spPr>
-              <p:txBody>
-                <a:bodyPr wrap="none" rtlCol="0">
-                  <a:spAutoFit/>
-                </a:bodyPr>
-                <a:lstStyle/>
-                <a:p>
-                  <a:r>
-                    <a:rPr lang="en-US" sz="2300" b="1" dirty="0">
-                      <a:latin typeface="Calibri" panose="020F0502020204030204" pitchFamily="34" charset="0"/>
-                      <a:cs typeface="Calibri" panose="020F0502020204030204" pitchFamily="34" charset="0"/>
-                    </a:rPr>
-                    <a:t>C</a:t>
-                  </a:r>
-                </a:p>
-              </p:txBody>
-            </p:sp>
-            <p:sp>
-              <p:nvSpPr>
-                <p:cNvPr id="20" name="TextBox 19">
-                  <a:extLst>
-                    <a:ext uri="{FF2B5EF4-FFF2-40B4-BE49-F238E27FC236}">
-                      <a16:creationId xmlns:a16="http://schemas.microsoft.com/office/drawing/2014/main" id="{1CD150B0-14FF-F4BE-C575-6D47ED5F1D4E}"/>
-                    </a:ext>
-                  </a:extLst>
-                </p:cNvPr>
-                <p:cNvSpPr txBox="1"/>
-                <p:nvPr/>
-              </p:nvSpPr>
-              <p:spPr>
-                <a:xfrm>
-                  <a:off x="6091405" y="3209803"/>
-                  <a:ext cx="370614" cy="446276"/>
-                </a:xfrm>
-                <a:prstGeom prst="rect">
-                  <a:avLst/>
-                </a:prstGeom>
-                <a:noFill/>
-              </p:spPr>
-              <p:txBody>
-                <a:bodyPr wrap="none" rtlCol="0">
-                  <a:spAutoFit/>
-                </a:bodyPr>
-                <a:lstStyle/>
-                <a:p>
-                  <a:r>
-                    <a:rPr lang="en-US" sz="2300" b="1" dirty="0">
-                      <a:latin typeface="Calibri" panose="020F0502020204030204" pitchFamily="34" charset="0"/>
-                      <a:cs typeface="Calibri" panose="020F0502020204030204" pitchFamily="34" charset="0"/>
-                    </a:rPr>
-                    <a:t>D</a:t>
-                  </a:r>
-                </a:p>
-              </p:txBody>
-            </p:sp>
-          </p:grpSp>
+              <a:prstGeom prst="rect">
+                <a:avLst/>
+              </a:prstGeom>
+            </p:spPr>
+          </p:pic>
           <p:sp>
             <p:nvSpPr>
-              <p:cNvPr id="2" name="Rectangle 1">
+              <p:cNvPr id="14" name="TextBox 13">
                 <a:extLst>
                   <a:ext uri="{FF2B5EF4-FFF2-40B4-BE49-F238E27FC236}">
-                    <a16:creationId xmlns:a16="http://schemas.microsoft.com/office/drawing/2014/main" id="{D6C6335F-1DEE-BF6B-96BC-B7730907BF9D}"/>
+                    <a16:creationId xmlns:a16="http://schemas.microsoft.com/office/drawing/2014/main" id="{5AF827EB-5DE1-4CA9-B83D-61AEF956A472}"/>
+                  </a:ext>
+                </a:extLst>
+              </p:cNvPr>
+              <p:cNvSpPr txBox="1"/>
+              <p:nvPr/>
+            </p:nvSpPr>
+            <p:spPr>
+              <a:xfrm>
+                <a:off x="0" y="-27093"/>
+                <a:ext cx="367408" cy="446276"/>
+              </a:xfrm>
+              <a:prstGeom prst="rect">
+                <a:avLst/>
+              </a:prstGeom>
+              <a:noFill/>
+            </p:spPr>
+            <p:txBody>
+              <a:bodyPr wrap="none" rtlCol="0">
+                <a:spAutoFit/>
+              </a:bodyPr>
+              <a:lstStyle/>
+              <a:p>
+                <a:r>
+                  <a:rPr lang="en-US" sz="2300" b="1" dirty="0">
+                    <a:latin typeface="Calibri" panose="020F0502020204030204" pitchFamily="34" charset="0"/>
+                    <a:cs typeface="Calibri" panose="020F0502020204030204" pitchFamily="34" charset="0"/>
+                  </a:rPr>
+                  <a:t>A</a:t>
+                </a:r>
+              </a:p>
+            </p:txBody>
+          </p:sp>
+          <p:pic>
+            <p:nvPicPr>
+              <p:cNvPr id="24" name="Picture 23" descr="A computer screen shot of a computer&#10;&#10;AI-generated content may be incorrect.">
+                <a:extLst>
+                  <a:ext uri="{FF2B5EF4-FFF2-40B4-BE49-F238E27FC236}">
+                    <a16:creationId xmlns:a16="http://schemas.microsoft.com/office/drawing/2014/main" id="{2CEC2402-14B3-FC2B-C15E-7F28CF859793}"/>
+                  </a:ext>
+                </a:extLst>
+              </p:cNvPr>
+              <p:cNvPicPr>
+                <a:picLocks noChangeAspect="1"/>
+              </p:cNvPicPr>
+              <p:nvPr/>
+            </p:nvPicPr>
+            <p:blipFill>
+              <a:blip r:embed="rId4"/>
+              <a:srcRect l="21858" t="10304" b="11939"/>
+              <a:stretch>
+                <a:fillRect/>
+              </a:stretch>
+            </p:blipFill>
+            <p:spPr>
+              <a:xfrm>
+                <a:off x="7819125" y="196045"/>
+                <a:ext cx="3333736" cy="2533228"/>
+              </a:xfrm>
+              <a:prstGeom prst="rect">
+                <a:avLst/>
+              </a:prstGeom>
+            </p:spPr>
+          </p:pic>
+          <p:pic>
+            <p:nvPicPr>
+              <p:cNvPr id="27" name="Picture 26" descr="A screen shot of a computer&#10;&#10;AI-generated content may be incorrect.">
+                <a:extLst>
+                  <a:ext uri="{FF2B5EF4-FFF2-40B4-BE49-F238E27FC236}">
+                    <a16:creationId xmlns:a16="http://schemas.microsoft.com/office/drawing/2014/main" id="{706436BE-E00E-F461-B35D-A65663DCE2DE}"/>
+                  </a:ext>
+                </a:extLst>
+              </p:cNvPr>
+              <p:cNvPicPr>
+                <a:picLocks noChangeAspect="1"/>
+              </p:cNvPicPr>
+              <p:nvPr/>
+            </p:nvPicPr>
+            <p:blipFill>
+              <a:blip r:embed="rId5"/>
+              <a:srcRect l="20724" t="14575" b="12416"/>
+              <a:stretch>
+                <a:fillRect/>
+              </a:stretch>
+            </p:blipFill>
+            <p:spPr>
+              <a:xfrm>
+                <a:off x="236813" y="3172385"/>
+                <a:ext cx="3545498" cy="2533228"/>
+              </a:xfrm>
+              <a:prstGeom prst="rect">
+                <a:avLst/>
+              </a:prstGeom>
+            </p:spPr>
+          </p:pic>
+          <p:pic>
+            <p:nvPicPr>
+              <p:cNvPr id="29" name="Picture 28" descr="A computer screen shot of a black background&#10;&#10;AI-generated content may be incorrect.">
+                <a:extLst>
+                  <a:ext uri="{FF2B5EF4-FFF2-40B4-BE49-F238E27FC236}">
+                    <a16:creationId xmlns:a16="http://schemas.microsoft.com/office/drawing/2014/main" id="{CCE66F5B-ACA4-C7A6-CB7C-76FE035EAC08}"/>
+                  </a:ext>
+                </a:extLst>
+              </p:cNvPr>
+              <p:cNvPicPr>
+                <a:picLocks noChangeAspect="1"/>
+              </p:cNvPicPr>
+              <p:nvPr/>
+            </p:nvPicPr>
+            <p:blipFill>
+              <a:blip r:embed="rId6"/>
+              <a:srcRect l="21175" t="8251" b="10284"/>
+              <a:stretch>
+                <a:fillRect/>
+              </a:stretch>
+            </p:blipFill>
+            <p:spPr>
+              <a:xfrm>
+                <a:off x="246174" y="222003"/>
+                <a:ext cx="3209777" cy="2533228"/>
+              </a:xfrm>
+              <a:prstGeom prst="rect">
+                <a:avLst/>
+              </a:prstGeom>
+            </p:spPr>
+          </p:pic>
+          <p:pic>
+            <p:nvPicPr>
+              <p:cNvPr id="31" name="Picture 30" descr="A computer screen shot of a diagram&#10;&#10;AI-generated content may be incorrect.">
+                <a:extLst>
+                  <a:ext uri="{FF2B5EF4-FFF2-40B4-BE49-F238E27FC236}">
+                    <a16:creationId xmlns:a16="http://schemas.microsoft.com/office/drawing/2014/main" id="{17E0891D-F721-E970-728B-C10066914BCA}"/>
+                  </a:ext>
+                </a:extLst>
+              </p:cNvPr>
+              <p:cNvPicPr>
+                <a:picLocks noChangeAspect="1"/>
+              </p:cNvPicPr>
+              <p:nvPr/>
+            </p:nvPicPr>
+            <p:blipFill>
+              <a:blip r:embed="rId7"/>
+              <a:srcRect l="21035" t="11133" b="11133"/>
+              <a:stretch>
+                <a:fillRect/>
+              </a:stretch>
+            </p:blipFill>
+            <p:spPr>
+              <a:xfrm>
+                <a:off x="3952596" y="196045"/>
+                <a:ext cx="3369884" cy="2533228"/>
+              </a:xfrm>
+              <a:prstGeom prst="rect">
+                <a:avLst/>
+              </a:prstGeom>
+            </p:spPr>
+          </p:pic>
+          <p:pic>
+            <p:nvPicPr>
+              <p:cNvPr id="35" name="Picture 34" descr="A black background with colorful dots and lines&#10;&#10;AI-generated content may be incorrect.">
+                <a:extLst>
+                  <a:ext uri="{FF2B5EF4-FFF2-40B4-BE49-F238E27FC236}">
+                    <a16:creationId xmlns:a16="http://schemas.microsoft.com/office/drawing/2014/main" id="{C582AE2C-6886-0E86-5E14-68FC51E9ED45}"/>
+                  </a:ext>
+                </a:extLst>
+              </p:cNvPr>
+              <p:cNvPicPr>
+                <a:picLocks noChangeAspect="1"/>
+              </p:cNvPicPr>
+              <p:nvPr/>
+            </p:nvPicPr>
+            <p:blipFill>
+              <a:blip r:embed="rId8"/>
+              <a:srcRect l="20752" t="14717" b="12500"/>
+              <a:stretch>
+                <a:fillRect/>
+              </a:stretch>
+            </p:blipFill>
+            <p:spPr>
+              <a:xfrm>
+                <a:off x="3952596" y="3184618"/>
+                <a:ext cx="3611955" cy="2533227"/>
+              </a:xfrm>
+              <a:prstGeom prst="rect">
+                <a:avLst/>
+              </a:prstGeom>
+            </p:spPr>
+          </p:pic>
+          <p:pic>
+            <p:nvPicPr>
+              <p:cNvPr id="37" name="Picture 36" descr="A computer screen shot of a computer screen&#10;&#10;AI-generated content may be incorrect.">
+                <a:extLst>
+                  <a:ext uri="{FF2B5EF4-FFF2-40B4-BE49-F238E27FC236}">
+                    <a16:creationId xmlns:a16="http://schemas.microsoft.com/office/drawing/2014/main" id="{3611CE9C-9418-DC66-097F-411ABFDB80EE}"/>
+                  </a:ext>
+                </a:extLst>
+              </p:cNvPr>
+              <p:cNvPicPr>
+                <a:picLocks noChangeAspect="1"/>
+              </p:cNvPicPr>
+              <p:nvPr/>
+            </p:nvPicPr>
+            <p:blipFill>
+              <a:blip r:embed="rId9"/>
+              <a:srcRect l="20502" t="8806" b="6773"/>
+              <a:stretch>
+                <a:fillRect/>
+              </a:stretch>
+            </p:blipFill>
+            <p:spPr>
+              <a:xfrm>
+                <a:off x="7819125" y="3184618"/>
+                <a:ext cx="3609130" cy="2926746"/>
+              </a:xfrm>
+              <a:prstGeom prst="rect">
+                <a:avLst/>
+              </a:prstGeom>
+            </p:spPr>
+          </p:pic>
+          <p:sp>
+            <p:nvSpPr>
+              <p:cNvPr id="38" name="TextBox 37">
+                <a:extLst>
+                  <a:ext uri="{FF2B5EF4-FFF2-40B4-BE49-F238E27FC236}">
+                    <a16:creationId xmlns:a16="http://schemas.microsoft.com/office/drawing/2014/main" id="{7AB0B2F4-FDB0-EA30-D71B-82E734CF2FA8}"/>
+                  </a:ext>
+                </a:extLst>
+              </p:cNvPr>
+              <p:cNvSpPr txBox="1"/>
+              <p:nvPr/>
+            </p:nvSpPr>
+            <p:spPr>
+              <a:xfrm>
+                <a:off x="3531897" y="-14861"/>
+                <a:ext cx="349776" cy="446276"/>
+              </a:xfrm>
+              <a:prstGeom prst="rect">
+                <a:avLst/>
+              </a:prstGeom>
+              <a:noFill/>
+            </p:spPr>
+            <p:txBody>
+              <a:bodyPr wrap="none" rtlCol="0">
+                <a:spAutoFit/>
+              </a:bodyPr>
+              <a:lstStyle/>
+              <a:p>
+                <a:r>
+                  <a:rPr lang="en-US" sz="2300" b="1" dirty="0">
+                    <a:latin typeface="Calibri" panose="020F0502020204030204" pitchFamily="34" charset="0"/>
+                    <a:cs typeface="Calibri" panose="020F0502020204030204" pitchFamily="34" charset="0"/>
+                  </a:rPr>
+                  <a:t>B</a:t>
+                </a:r>
+              </a:p>
+            </p:txBody>
+          </p:sp>
+          <p:sp>
+            <p:nvSpPr>
+              <p:cNvPr id="39" name="TextBox 38">
+                <a:extLst>
+                  <a:ext uri="{FF2B5EF4-FFF2-40B4-BE49-F238E27FC236}">
+                    <a16:creationId xmlns:a16="http://schemas.microsoft.com/office/drawing/2014/main" id="{74B62E01-11D9-B475-D907-D2A240B15E49}"/>
+                  </a:ext>
+                </a:extLst>
+              </p:cNvPr>
+              <p:cNvSpPr txBox="1"/>
+              <p:nvPr/>
+            </p:nvSpPr>
+            <p:spPr>
+              <a:xfrm>
+                <a:off x="7404488" y="0"/>
+                <a:ext cx="340158" cy="446276"/>
+              </a:xfrm>
+              <a:prstGeom prst="rect">
+                <a:avLst/>
+              </a:prstGeom>
+              <a:noFill/>
+            </p:spPr>
+            <p:txBody>
+              <a:bodyPr wrap="none" rtlCol="0">
+                <a:spAutoFit/>
+              </a:bodyPr>
+              <a:lstStyle/>
+              <a:p>
+                <a:r>
+                  <a:rPr lang="en-US" sz="2300" b="1" dirty="0">
+                    <a:latin typeface="Calibri" panose="020F0502020204030204" pitchFamily="34" charset="0"/>
+                    <a:cs typeface="Calibri" panose="020F0502020204030204" pitchFamily="34" charset="0"/>
+                  </a:rPr>
+                  <a:t>C</a:t>
+                </a:r>
+              </a:p>
+            </p:txBody>
+          </p:sp>
+          <p:sp>
+            <p:nvSpPr>
+              <p:cNvPr id="40" name="TextBox 39">
+                <a:extLst>
+                  <a:ext uri="{FF2B5EF4-FFF2-40B4-BE49-F238E27FC236}">
+                    <a16:creationId xmlns:a16="http://schemas.microsoft.com/office/drawing/2014/main" id="{6181016F-A2BB-EC1B-8735-FCFFD130EAD7}"/>
+                  </a:ext>
+                </a:extLst>
+              </p:cNvPr>
+              <p:cNvSpPr txBox="1"/>
+              <p:nvPr/>
+            </p:nvSpPr>
+            <p:spPr>
+              <a:xfrm>
+                <a:off x="-5667" y="2847788"/>
+                <a:ext cx="370614" cy="446276"/>
+              </a:xfrm>
+              <a:prstGeom prst="rect">
+                <a:avLst/>
+              </a:prstGeom>
+              <a:noFill/>
+            </p:spPr>
+            <p:txBody>
+              <a:bodyPr wrap="none" rtlCol="0">
+                <a:spAutoFit/>
+              </a:bodyPr>
+              <a:lstStyle/>
+              <a:p>
+                <a:r>
+                  <a:rPr lang="en-US" sz="2300" b="1" dirty="0">
+                    <a:latin typeface="Calibri" panose="020F0502020204030204" pitchFamily="34" charset="0"/>
+                    <a:cs typeface="Calibri" panose="020F0502020204030204" pitchFamily="34" charset="0"/>
+                  </a:rPr>
+                  <a:t>D</a:t>
+                </a:r>
+              </a:p>
+            </p:txBody>
+          </p:sp>
+          <p:sp>
+            <p:nvSpPr>
+              <p:cNvPr id="41" name="TextBox 40">
+                <a:extLst>
+                  <a:ext uri="{FF2B5EF4-FFF2-40B4-BE49-F238E27FC236}">
+                    <a16:creationId xmlns:a16="http://schemas.microsoft.com/office/drawing/2014/main" id="{1D7DFA35-7E72-D66E-F3AC-72793892ED9F}"/>
+                  </a:ext>
+                </a:extLst>
+              </p:cNvPr>
+              <p:cNvSpPr txBox="1"/>
+              <p:nvPr/>
+            </p:nvSpPr>
+            <p:spPr>
+              <a:xfrm>
+                <a:off x="3550915" y="2845376"/>
+                <a:ext cx="328936" cy="446276"/>
+              </a:xfrm>
+              <a:prstGeom prst="rect">
+                <a:avLst/>
+              </a:prstGeom>
+              <a:noFill/>
+            </p:spPr>
+            <p:txBody>
+              <a:bodyPr wrap="none" rtlCol="0">
+                <a:spAutoFit/>
+              </a:bodyPr>
+              <a:lstStyle/>
+              <a:p>
+                <a:r>
+                  <a:rPr lang="en-US" sz="2300" b="1" dirty="0">
+                    <a:latin typeface="Calibri" panose="020F0502020204030204" pitchFamily="34" charset="0"/>
+                    <a:cs typeface="Calibri" panose="020F0502020204030204" pitchFamily="34" charset="0"/>
+                  </a:rPr>
+                  <a:t>E</a:t>
+                </a:r>
+              </a:p>
+            </p:txBody>
+          </p:sp>
+          <p:sp>
+            <p:nvSpPr>
+              <p:cNvPr id="42" name="TextBox 41">
+                <a:extLst>
+                  <a:ext uri="{FF2B5EF4-FFF2-40B4-BE49-F238E27FC236}">
+                    <a16:creationId xmlns:a16="http://schemas.microsoft.com/office/drawing/2014/main" id="{11DC832D-6928-F2EF-85B9-CDD5E6816B50}"/>
+                  </a:ext>
+                </a:extLst>
+              </p:cNvPr>
+              <p:cNvSpPr txBox="1"/>
+              <p:nvPr/>
+            </p:nvSpPr>
+            <p:spPr>
+              <a:xfrm>
+                <a:off x="7415518" y="2850355"/>
+                <a:ext cx="319318" cy="446276"/>
+              </a:xfrm>
+              <a:prstGeom prst="rect">
+                <a:avLst/>
+              </a:prstGeom>
+              <a:noFill/>
+            </p:spPr>
+            <p:txBody>
+              <a:bodyPr wrap="none" rtlCol="0">
+                <a:spAutoFit/>
+              </a:bodyPr>
+              <a:lstStyle/>
+              <a:p>
+                <a:r>
+                  <a:rPr lang="en-US" sz="2300" b="1" dirty="0">
+                    <a:latin typeface="Calibri" panose="020F0502020204030204" pitchFamily="34" charset="0"/>
+                    <a:cs typeface="Calibri" panose="020F0502020204030204" pitchFamily="34" charset="0"/>
+                  </a:rPr>
+                  <a:t>F</a:t>
+                </a:r>
+              </a:p>
+            </p:txBody>
+          </p:sp>
+          <p:sp>
+            <p:nvSpPr>
+              <p:cNvPr id="6" name="Rectangle 5">
+                <a:extLst>
+                  <a:ext uri="{FF2B5EF4-FFF2-40B4-BE49-F238E27FC236}">
+                    <a16:creationId xmlns:a16="http://schemas.microsoft.com/office/drawing/2014/main" id="{C018C88D-BBF7-ECE5-9E24-8E0C99B1CDFA}"/>
                   </a:ext>
                 </a:extLst>
               </p:cNvPr>
@@ -4384,8 +4313,8 @@
             </p:nvSpPr>
             <p:spPr>
               <a:xfrm>
-                <a:off x="3452698" y="2133935"/>
-                <a:ext cx="1646778" cy="378919"/>
+                <a:off x="1279784" y="1373875"/>
+                <a:ext cx="2111416" cy="241109"/>
               </a:xfrm>
               <a:prstGeom prst="rect">
                 <a:avLst/>
@@ -4426,10 +4355,10 @@
           </p:sp>
           <p:sp>
             <p:nvSpPr>
-              <p:cNvPr id="3" name="Rectangle 2">
+              <p:cNvPr id="43" name="Rectangle 42">
                 <a:extLst>
                   <a:ext uri="{FF2B5EF4-FFF2-40B4-BE49-F238E27FC236}">
-                    <a16:creationId xmlns:a16="http://schemas.microsoft.com/office/drawing/2014/main" id="{9F02761E-A7DA-D94B-B862-3DEC64C3265F}"/>
+                    <a16:creationId xmlns:a16="http://schemas.microsoft.com/office/drawing/2014/main" id="{65915C64-2CE2-E42A-727B-872DC5B4C18C}"/>
                   </a:ext>
                 </a:extLst>
               </p:cNvPr>
@@ -4438,8 +4367,8 @@
             </p:nvSpPr>
             <p:spPr>
               <a:xfrm>
-                <a:off x="7124980" y="625851"/>
-                <a:ext cx="2284491" cy="176461"/>
+                <a:off x="881443" y="4355955"/>
+                <a:ext cx="2900868" cy="84118"/>
               </a:xfrm>
               <a:prstGeom prst="rect">
                 <a:avLst/>
@@ -4480,10 +4409,10 @@
           </p:sp>
           <p:sp>
             <p:nvSpPr>
-              <p:cNvPr id="4" name="Rectangle 3">
+              <p:cNvPr id="44" name="Rectangle 43">
                 <a:extLst>
                   <a:ext uri="{FF2B5EF4-FFF2-40B4-BE49-F238E27FC236}">
-                    <a16:creationId xmlns:a16="http://schemas.microsoft.com/office/drawing/2014/main" id="{1CBC0311-3316-ABBC-B3A0-425C7299DA91}"/>
+                    <a16:creationId xmlns:a16="http://schemas.microsoft.com/office/drawing/2014/main" id="{37667F6C-4DEB-EA3E-6486-D7902086ABA3}"/>
                   </a:ext>
                 </a:extLst>
               </p:cNvPr>
@@ -4492,8 +4421,8 @@
             </p:nvSpPr>
             <p:spPr>
               <a:xfrm>
-                <a:off x="7086169" y="2914281"/>
-                <a:ext cx="2828659" cy="88491"/>
+                <a:off x="881443" y="5442066"/>
+                <a:ext cx="2399058" cy="144418"/>
               </a:xfrm>
               <a:prstGeom prst="rect">
                 <a:avLst/>
@@ -4534,10 +4463,10 @@
           </p:sp>
           <p:sp>
             <p:nvSpPr>
-              <p:cNvPr id="6" name="Rectangle 5">
+              <p:cNvPr id="45" name="Rectangle 44">
                 <a:extLst>
                   <a:ext uri="{FF2B5EF4-FFF2-40B4-BE49-F238E27FC236}">
-                    <a16:creationId xmlns:a16="http://schemas.microsoft.com/office/drawing/2014/main" id="{C018C88D-BBF7-ECE5-9E24-8E0C99B1CDFA}"/>
+                    <a16:creationId xmlns:a16="http://schemas.microsoft.com/office/drawing/2014/main" id="{6AE148A9-70F6-A624-56E4-293047FFE24A}"/>
                   </a:ext>
                 </a:extLst>
               </p:cNvPr>
@@ -4546,8 +4475,8 @@
             </p:nvSpPr>
             <p:spPr>
               <a:xfrm>
-                <a:off x="2878885" y="5689316"/>
-                <a:ext cx="2672812" cy="251334"/>
+                <a:off x="5349714" y="492026"/>
+                <a:ext cx="1879050" cy="76631"/>
               </a:xfrm>
               <a:prstGeom prst="rect">
                 <a:avLst/>
@@ -4588,10 +4517,10 @@
           </p:sp>
           <p:sp>
             <p:nvSpPr>
-              <p:cNvPr id="8" name="Rectangle 7">
+              <p:cNvPr id="46" name="Rectangle 45">
                 <a:extLst>
                   <a:ext uri="{FF2B5EF4-FFF2-40B4-BE49-F238E27FC236}">
-                    <a16:creationId xmlns:a16="http://schemas.microsoft.com/office/drawing/2014/main" id="{C4C847AF-08A2-3C02-F41F-92B0A1EA4734}"/>
+                    <a16:creationId xmlns:a16="http://schemas.microsoft.com/office/drawing/2014/main" id="{82339905-26EA-4D0C-2112-E757AAA4D522}"/>
                   </a:ext>
                 </a:extLst>
               </p:cNvPr>
@@ -4600,8 +4529,8 @@
             </p:nvSpPr>
             <p:spPr>
               <a:xfrm>
-                <a:off x="2903043" y="3624736"/>
-                <a:ext cx="2169183" cy="74289"/>
+                <a:off x="4613019" y="3866587"/>
+                <a:ext cx="2951532" cy="273234"/>
               </a:xfrm>
               <a:prstGeom prst="rect">
                 <a:avLst/>
@@ -4642,10 +4571,10 @@
           </p:sp>
           <p:sp>
             <p:nvSpPr>
-              <p:cNvPr id="10" name="Rectangle 9">
+              <p:cNvPr id="47" name="Rectangle 46">
                 <a:extLst>
                   <a:ext uri="{FF2B5EF4-FFF2-40B4-BE49-F238E27FC236}">
-                    <a16:creationId xmlns:a16="http://schemas.microsoft.com/office/drawing/2014/main" id="{086192D1-68E6-C53C-5CE3-6D0E8E538546}"/>
+                    <a16:creationId xmlns:a16="http://schemas.microsoft.com/office/drawing/2014/main" id="{41945321-7201-1341-AE89-AA9E86F0DDFD}"/>
                   </a:ext>
                 </a:extLst>
               </p:cNvPr>
@@ -4654,8 +4583,8 @@
             </p:nvSpPr>
             <p:spPr>
               <a:xfrm>
-                <a:off x="7164092" y="3846421"/>
-                <a:ext cx="2245379" cy="251334"/>
+                <a:off x="4613019" y="5514275"/>
+                <a:ext cx="2429226" cy="108603"/>
               </a:xfrm>
               <a:prstGeom prst="rect">
                 <a:avLst/>
@@ -4696,10 +4625,10 @@
           </p:sp>
           <p:sp>
             <p:nvSpPr>
-              <p:cNvPr id="12" name="Rectangle 11">
+              <p:cNvPr id="48" name="Rectangle 47">
                 <a:extLst>
                   <a:ext uri="{FF2B5EF4-FFF2-40B4-BE49-F238E27FC236}">
-                    <a16:creationId xmlns:a16="http://schemas.microsoft.com/office/drawing/2014/main" id="{A1903D4D-374E-8B54-CA22-2F38164AD0B7}"/>
+                    <a16:creationId xmlns:a16="http://schemas.microsoft.com/office/drawing/2014/main" id="{B182A236-84F8-563D-25D9-690D3D447593}"/>
                   </a:ext>
                 </a:extLst>
               </p:cNvPr>
@@ -4708,8 +4637,116 @@
             </p:nvSpPr>
             <p:spPr>
               <a:xfrm>
-                <a:off x="7164092" y="5056249"/>
-                <a:ext cx="2750736" cy="251334"/>
+                <a:off x="8533917" y="3944446"/>
+                <a:ext cx="2388841" cy="273234"/>
+              </a:xfrm>
+              <a:prstGeom prst="rect">
+                <a:avLst/>
+              </a:prstGeom>
+              <a:solidFill>
+                <a:srgbClr val="FFFF00">
+                  <a:alpha val="34140"/>
+                </a:srgbClr>
+              </a:solidFill>
+              <a:ln>
+                <a:noFill/>
+              </a:ln>
+            </p:spPr>
+            <p:style>
+              <a:lnRef idx="2">
+                <a:schemeClr val="accent1">
+                  <a:shade val="15000"/>
+                </a:schemeClr>
+              </a:lnRef>
+              <a:fillRef idx="1">
+                <a:schemeClr val="accent1"/>
+              </a:fillRef>
+              <a:effectRef idx="0">
+                <a:schemeClr val="accent1"/>
+              </a:effectRef>
+              <a:fontRef idx="minor">
+                <a:schemeClr val="lt1"/>
+              </a:fontRef>
+            </p:style>
+            <p:txBody>
+              <a:bodyPr rtlCol="0" anchor="ctr"/>
+              <a:lstStyle/>
+              <a:p>
+                <a:pPr algn="ctr"/>
+                <a:endParaRPr lang="en-US" dirty="0"/>
+              </a:p>
+            </p:txBody>
+          </p:sp>
+          <p:sp>
+            <p:nvSpPr>
+              <p:cNvPr id="49" name="Rectangle 48">
+                <a:extLst>
+                  <a:ext uri="{FF2B5EF4-FFF2-40B4-BE49-F238E27FC236}">
+                    <a16:creationId xmlns:a16="http://schemas.microsoft.com/office/drawing/2014/main" id="{CC7ACC45-0AFA-5A65-6BC5-29BFB7125E67}"/>
+                  </a:ext>
+                </a:extLst>
+              </p:cNvPr>
+              <p:cNvSpPr/>
+              <p:nvPr/>
+            </p:nvSpPr>
+            <p:spPr>
+              <a:xfrm>
+                <a:off x="8533917" y="5514275"/>
+                <a:ext cx="2894338" cy="273234"/>
+              </a:xfrm>
+              <a:prstGeom prst="rect">
+                <a:avLst/>
+              </a:prstGeom>
+              <a:solidFill>
+                <a:srgbClr val="FFFF00">
+                  <a:alpha val="34140"/>
+                </a:srgbClr>
+              </a:solidFill>
+              <a:ln>
+                <a:noFill/>
+              </a:ln>
+            </p:spPr>
+            <p:style>
+              <a:lnRef idx="2">
+                <a:schemeClr val="accent1">
+                  <a:shade val="15000"/>
+                </a:schemeClr>
+              </a:lnRef>
+              <a:fillRef idx="1">
+                <a:schemeClr val="accent1"/>
+              </a:fillRef>
+              <a:effectRef idx="0">
+                <a:schemeClr val="accent1"/>
+              </a:effectRef>
+              <a:fontRef idx="minor">
+                <a:schemeClr val="lt1"/>
+              </a:fontRef>
+            </p:style>
+            <p:txBody>
+              <a:bodyPr rtlCol="0" anchor="ctr"/>
+              <a:lstStyle/>
+              <a:p>
+                <a:pPr algn="ctr"/>
+                <a:endParaRPr lang="en-US" dirty="0"/>
+              </a:p>
+            </p:txBody>
+          </p:sp>
+          <p:sp>
+            <p:nvSpPr>
+              <p:cNvPr id="50" name="Rectangle 49">
+                <a:extLst>
+                  <a:ext uri="{FF2B5EF4-FFF2-40B4-BE49-F238E27FC236}">
+                    <a16:creationId xmlns:a16="http://schemas.microsoft.com/office/drawing/2014/main" id="{A3F0B49F-75E6-50FF-50EF-821C033D8507}"/>
+                  </a:ext>
+                </a:extLst>
+              </p:cNvPr>
+              <p:cNvSpPr/>
+              <p:nvPr/>
+            </p:nvSpPr>
+            <p:spPr>
+              <a:xfrm>
+                <a:off x="9277800" y="1901369"/>
+                <a:ext cx="1875061" cy="396004"/>
               </a:xfrm>
               <a:prstGeom prst="rect">
                 <a:avLst/>
@@ -4749,574 +4786,11 @@
             </p:txBody>
           </p:sp>
         </p:grpSp>
-        <p:pic>
-          <p:nvPicPr>
-            <p:cNvPr id="24" name="Picture 23" descr="A computer screen shot of a computer&#10;&#10;AI-generated content may be incorrect.">
-              <a:extLst>
-                <a:ext uri="{FF2B5EF4-FFF2-40B4-BE49-F238E27FC236}">
-                  <a16:creationId xmlns:a16="http://schemas.microsoft.com/office/drawing/2014/main" id="{2CEC2402-14B3-FC2B-C15E-7F28CF859793}"/>
-                </a:ext>
-              </a:extLst>
-            </p:cNvPr>
-            <p:cNvPicPr>
-              <a:picLocks noChangeAspect="1"/>
-            </p:cNvPicPr>
-            <p:nvPr/>
-          </p:nvPicPr>
-          <p:blipFill>
-            <a:blip r:embed="rId7"/>
-            <a:srcRect l="21858"/>
-            <a:stretch>
-              <a:fillRect/>
-            </a:stretch>
-          </p:blipFill>
-          <p:spPr>
-            <a:xfrm>
-              <a:off x="2221908" y="417057"/>
-              <a:ext cx="2850318" cy="2785462"/>
-            </a:xfrm>
-            <a:prstGeom prst="rect">
-              <a:avLst/>
-            </a:prstGeom>
-          </p:spPr>
-        </p:pic>
       </p:grpSp>
     </p:spTree>
     <p:extLst>
       <p:ext uri="{BB962C8B-B14F-4D97-AF65-F5344CB8AC3E}">
         <p14:creationId xmlns:p14="http://schemas.microsoft.com/office/powerpoint/2010/main" val="2594857148"/>
-      </p:ext>
-    </p:extLst>
-  </p:cSld>
-  <p:clrMapOvr>
-    <a:masterClrMapping/>
-  </p:clrMapOvr>
-</p:sld>
-</file>
-
-<file path=ppt/slides/slide2.xml><?xml version="1.0" encoding="utf-8"?>
-<p:sld xmlns:a="http://schemas.openxmlformats.org/drawingml/2006/main" xmlns:r="http://schemas.openxmlformats.org/officeDocument/2006/relationships" xmlns:p="http://schemas.openxmlformats.org/presentationml/2006/main">
-  <p:cSld>
-    <p:spTree>
-      <p:nvGrpSpPr>
-        <p:cNvPr id="1" name="">
-          <a:extLst>
-            <a:ext uri="{FF2B5EF4-FFF2-40B4-BE49-F238E27FC236}">
-              <a16:creationId xmlns:a16="http://schemas.microsoft.com/office/drawing/2014/main" id="{BDA0AE64-8279-DEEA-1547-B231B2448549}"/>
-            </a:ext>
-          </a:extLst>
-        </p:cNvPr>
-        <p:cNvGrpSpPr/>
-        <p:nvPr/>
-      </p:nvGrpSpPr>
-      <p:grpSpPr>
-        <a:xfrm>
-          <a:off x="0" y="0"/>
-          <a:ext cx="0" cy="0"/>
-          <a:chOff x="0" y="0"/>
-          <a:chExt cx="0" cy="0"/>
-        </a:xfrm>
-      </p:grpSpPr>
-      <p:grpSp>
-        <p:nvGrpSpPr>
-          <p:cNvPr id="8" name="Group 7">
-            <a:extLst>
-              <a:ext uri="{FF2B5EF4-FFF2-40B4-BE49-F238E27FC236}">
-                <a16:creationId xmlns:a16="http://schemas.microsoft.com/office/drawing/2014/main" id="{2032377D-3DA3-B11C-CC1D-1C2C5DABFB4B}"/>
-              </a:ext>
-            </a:extLst>
-          </p:cNvPr>
-          <p:cNvGrpSpPr/>
-          <p:nvPr/>
-        </p:nvGrpSpPr>
-        <p:grpSpPr>
-          <a:xfrm>
-            <a:off x="1690353" y="0"/>
-            <a:ext cx="9472947" cy="5760074"/>
-            <a:chOff x="1690353" y="0"/>
-            <a:chExt cx="9472947" cy="5760074"/>
-          </a:xfrm>
-        </p:grpSpPr>
-        <p:grpSp>
-          <p:nvGrpSpPr>
-            <p:cNvPr id="17" name="Group 16">
-              <a:extLst>
-                <a:ext uri="{FF2B5EF4-FFF2-40B4-BE49-F238E27FC236}">
-                  <a16:creationId xmlns:a16="http://schemas.microsoft.com/office/drawing/2014/main" id="{1081438D-02B1-3D90-C593-2935404764D9}"/>
-                </a:ext>
-              </a:extLst>
-            </p:cNvPr>
-            <p:cNvGrpSpPr/>
-            <p:nvPr/>
-          </p:nvGrpSpPr>
-          <p:grpSpPr>
-            <a:xfrm>
-              <a:off x="1690353" y="0"/>
-              <a:ext cx="9472947" cy="5760074"/>
-              <a:chOff x="1690353" y="0"/>
-              <a:chExt cx="9472947" cy="5760074"/>
-            </a:xfrm>
-          </p:grpSpPr>
-          <p:sp>
-            <p:nvSpPr>
-              <p:cNvPr id="16" name="Rectangle 15">
-                <a:extLst>
-                  <a:ext uri="{FF2B5EF4-FFF2-40B4-BE49-F238E27FC236}">
-                    <a16:creationId xmlns:a16="http://schemas.microsoft.com/office/drawing/2014/main" id="{48597DC9-1795-D129-4FF0-231BB45B0AAC}"/>
-                  </a:ext>
-                </a:extLst>
-              </p:cNvPr>
-              <p:cNvSpPr/>
-              <p:nvPr/>
-            </p:nvSpPr>
-            <p:spPr>
-              <a:xfrm>
-                <a:off x="1690353" y="88900"/>
-                <a:ext cx="9472947" cy="5671174"/>
-              </a:xfrm>
-              <a:prstGeom prst="rect">
-                <a:avLst/>
-              </a:prstGeom>
-              <a:solidFill>
-                <a:schemeClr val="bg1"/>
-              </a:solidFill>
-              <a:ln>
-                <a:solidFill>
-                  <a:schemeClr val="bg1"/>
-                </a:solidFill>
-              </a:ln>
-            </p:spPr>
-            <p:style>
-              <a:lnRef idx="2">
-                <a:schemeClr val="accent1">
-                  <a:shade val="15000"/>
-                </a:schemeClr>
-              </a:lnRef>
-              <a:fillRef idx="1">
-                <a:schemeClr val="accent1"/>
-              </a:fillRef>
-              <a:effectRef idx="0">
-                <a:schemeClr val="accent1"/>
-              </a:effectRef>
-              <a:fontRef idx="minor">
-                <a:schemeClr val="lt1"/>
-              </a:fontRef>
-            </p:style>
-            <p:txBody>
-              <a:bodyPr rtlCol="0" anchor="ctr"/>
-              <a:lstStyle/>
-              <a:p>
-                <a:pPr algn="ctr"/>
-                <a:endParaRPr lang="en-US"/>
-              </a:p>
-            </p:txBody>
-          </p:sp>
-          <p:pic>
-            <p:nvPicPr>
-              <p:cNvPr id="5" name="Picture 4" descr="A computer screen shot of a computer&#10;&#10;AI-generated content may be incorrect.">
-                <a:extLst>
-                  <a:ext uri="{FF2B5EF4-FFF2-40B4-BE49-F238E27FC236}">
-                    <a16:creationId xmlns:a16="http://schemas.microsoft.com/office/drawing/2014/main" id="{F8CEDF5B-63CB-9DF0-68D7-9E208B1A594C}"/>
-                  </a:ext>
-                </a:extLst>
-              </p:cNvPr>
-              <p:cNvPicPr>
-                <a:picLocks noChangeAspect="1"/>
-              </p:cNvPicPr>
-              <p:nvPr/>
-            </p:nvPicPr>
-            <p:blipFill>
-              <a:blip r:embed="rId3"/>
-              <a:srcRect r="79501" b="4409"/>
-              <a:stretch>
-                <a:fillRect/>
-              </a:stretch>
-            </p:blipFill>
-            <p:spPr>
-              <a:xfrm>
-                <a:off x="10045454" y="1662646"/>
-                <a:ext cx="992101" cy="3532708"/>
-              </a:xfrm>
-              <a:prstGeom prst="rect">
-                <a:avLst/>
-              </a:prstGeom>
-            </p:spPr>
-          </p:pic>
-          <p:pic>
-            <p:nvPicPr>
-              <p:cNvPr id="3" name="Picture 2" descr="A computer screen shot of a diagram&#10;&#10;AI-generated content may be incorrect.">
-                <a:extLst>
-                  <a:ext uri="{FF2B5EF4-FFF2-40B4-BE49-F238E27FC236}">
-                    <a16:creationId xmlns:a16="http://schemas.microsoft.com/office/drawing/2014/main" id="{4EA28ED6-766F-F289-0E22-BC9153760F4C}"/>
-                  </a:ext>
-                </a:extLst>
-              </p:cNvPr>
-              <p:cNvPicPr>
-                <a:picLocks noChangeAspect="1"/>
-              </p:cNvPicPr>
-              <p:nvPr/>
-            </p:nvPicPr>
-            <p:blipFill>
-              <a:blip r:embed="rId4"/>
-              <a:srcRect l="20827" t="10378" b="12590"/>
-              <a:stretch>
-                <a:fillRect/>
-              </a:stretch>
-            </p:blipFill>
-            <p:spPr>
-              <a:xfrm>
-                <a:off x="6103290" y="302313"/>
-                <a:ext cx="3558247" cy="2643714"/>
-              </a:xfrm>
-              <a:prstGeom prst="rect">
-                <a:avLst/>
-              </a:prstGeom>
-            </p:spPr>
-          </p:pic>
-          <p:pic>
-            <p:nvPicPr>
-              <p:cNvPr id="6" name="Picture 5" descr="A computer screen shot of a computer screen&#10;&#10;AI-generated content may be incorrect.">
-                <a:extLst>
-                  <a:ext uri="{FF2B5EF4-FFF2-40B4-BE49-F238E27FC236}">
-                    <a16:creationId xmlns:a16="http://schemas.microsoft.com/office/drawing/2014/main" id="{8421B182-F81B-95EE-0DCF-3D914813F8FB}"/>
-                  </a:ext>
-                </a:extLst>
-              </p:cNvPr>
-              <p:cNvPicPr>
-                <a:picLocks noChangeAspect="1"/>
-              </p:cNvPicPr>
-              <p:nvPr/>
-            </p:nvPicPr>
-            <p:blipFill>
-              <a:blip r:embed="rId5"/>
-              <a:srcRect l="20580" t="8757" b="10968"/>
-              <a:stretch>
-                <a:fillRect/>
-              </a:stretch>
-            </p:blipFill>
-            <p:spPr>
-              <a:xfrm>
-                <a:off x="2057763" y="342996"/>
-                <a:ext cx="3558247" cy="2746436"/>
-              </a:xfrm>
-              <a:prstGeom prst="rect">
-                <a:avLst/>
-              </a:prstGeom>
-            </p:spPr>
-          </p:pic>
-          <p:pic>
-            <p:nvPicPr>
-              <p:cNvPr id="10" name="Picture 9" descr="A screen shot of a game&#10;&#10;AI-generated content may be incorrect.">
-                <a:extLst>
-                  <a:ext uri="{FF2B5EF4-FFF2-40B4-BE49-F238E27FC236}">
-                    <a16:creationId xmlns:a16="http://schemas.microsoft.com/office/drawing/2014/main" id="{391CE28B-F9AB-A485-3C1B-49461B1214A2}"/>
-                  </a:ext>
-                </a:extLst>
-              </p:cNvPr>
-              <p:cNvPicPr>
-                <a:picLocks noChangeAspect="1"/>
-              </p:cNvPicPr>
-              <p:nvPr/>
-            </p:nvPicPr>
-            <p:blipFill>
-              <a:blip r:embed="rId6"/>
-              <a:srcRect l="20804" t="20596" r="-348" b="23050"/>
-              <a:stretch>
-                <a:fillRect/>
-              </a:stretch>
-            </p:blipFill>
-            <p:spPr>
-              <a:xfrm>
-                <a:off x="2057762" y="3835021"/>
-                <a:ext cx="3558247" cy="1925053"/>
-              </a:xfrm>
-              <a:prstGeom prst="rect">
-                <a:avLst/>
-              </a:prstGeom>
-            </p:spPr>
-          </p:pic>
-          <p:sp>
-            <p:nvSpPr>
-              <p:cNvPr id="12" name="TextBox 11">
-                <a:extLst>
-                  <a:ext uri="{FF2B5EF4-FFF2-40B4-BE49-F238E27FC236}">
-                    <a16:creationId xmlns:a16="http://schemas.microsoft.com/office/drawing/2014/main" id="{47E4C2EC-FE69-49A5-2B26-082F2C240853}"/>
-                  </a:ext>
-                </a:extLst>
-              </p:cNvPr>
-              <p:cNvSpPr txBox="1"/>
-              <p:nvPr/>
-            </p:nvSpPr>
-            <p:spPr>
-              <a:xfrm>
-                <a:off x="1690354" y="0"/>
-                <a:ext cx="367408" cy="446276"/>
-              </a:xfrm>
-              <a:prstGeom prst="rect">
-                <a:avLst/>
-              </a:prstGeom>
-              <a:noFill/>
-            </p:spPr>
-            <p:txBody>
-              <a:bodyPr wrap="none" rtlCol="0">
-                <a:spAutoFit/>
-              </a:bodyPr>
-              <a:lstStyle/>
-              <a:p>
-                <a:r>
-                  <a:rPr lang="en-US" sz="2300" b="1" dirty="0">
-                    <a:latin typeface="Calibri" panose="020F0502020204030204" pitchFamily="34" charset="0"/>
-                    <a:cs typeface="Calibri" panose="020F0502020204030204" pitchFamily="34" charset="0"/>
-                  </a:rPr>
-                  <a:t>A</a:t>
-                </a:r>
-              </a:p>
-            </p:txBody>
-          </p:sp>
-          <p:sp>
-            <p:nvSpPr>
-              <p:cNvPr id="14" name="TextBox 13">
-                <a:extLst>
-                  <a:ext uri="{FF2B5EF4-FFF2-40B4-BE49-F238E27FC236}">
-                    <a16:creationId xmlns:a16="http://schemas.microsoft.com/office/drawing/2014/main" id="{DA13E8D7-02C8-FAF7-FCF9-873124C68786}"/>
-                  </a:ext>
-                </a:extLst>
-              </p:cNvPr>
-              <p:cNvSpPr txBox="1"/>
-              <p:nvPr/>
-            </p:nvSpPr>
-            <p:spPr>
-              <a:xfrm>
-                <a:off x="5753514" y="0"/>
-                <a:ext cx="349776" cy="446276"/>
-              </a:xfrm>
-              <a:prstGeom prst="rect">
-                <a:avLst/>
-              </a:prstGeom>
-              <a:noFill/>
-            </p:spPr>
-            <p:txBody>
-              <a:bodyPr wrap="none" rtlCol="0">
-                <a:spAutoFit/>
-              </a:bodyPr>
-              <a:lstStyle/>
-              <a:p>
-                <a:r>
-                  <a:rPr lang="en-US" sz="2300" b="1" dirty="0">
-                    <a:latin typeface="Calibri" panose="020F0502020204030204" pitchFamily="34" charset="0"/>
-                    <a:cs typeface="Calibri" panose="020F0502020204030204" pitchFamily="34" charset="0"/>
-                  </a:rPr>
-                  <a:t>B</a:t>
-                </a:r>
-              </a:p>
-            </p:txBody>
-          </p:sp>
-          <p:sp>
-            <p:nvSpPr>
-              <p:cNvPr id="15" name="TextBox 14">
-                <a:extLst>
-                  <a:ext uri="{FF2B5EF4-FFF2-40B4-BE49-F238E27FC236}">
-                    <a16:creationId xmlns:a16="http://schemas.microsoft.com/office/drawing/2014/main" id="{16D865B9-12BD-65FF-33B1-E37501CB6781}"/>
-                  </a:ext>
-                </a:extLst>
-              </p:cNvPr>
-              <p:cNvSpPr txBox="1"/>
-              <p:nvPr/>
-            </p:nvSpPr>
-            <p:spPr>
-              <a:xfrm>
-                <a:off x="1690354" y="3611883"/>
-                <a:ext cx="340158" cy="446276"/>
-              </a:xfrm>
-              <a:prstGeom prst="rect">
-                <a:avLst/>
-              </a:prstGeom>
-              <a:noFill/>
-            </p:spPr>
-            <p:txBody>
-              <a:bodyPr wrap="none" rtlCol="0">
-                <a:spAutoFit/>
-              </a:bodyPr>
-              <a:lstStyle/>
-              <a:p>
-                <a:r>
-                  <a:rPr lang="en-US" sz="2300" b="1" dirty="0">
-                    <a:latin typeface="Calibri" panose="020F0502020204030204" pitchFamily="34" charset="0"/>
-                    <a:cs typeface="Calibri" panose="020F0502020204030204" pitchFamily="34" charset="0"/>
-                  </a:rPr>
-                  <a:t>C</a:t>
-                </a:r>
-              </a:p>
-            </p:txBody>
-          </p:sp>
-        </p:grpSp>
-        <p:sp>
-          <p:nvSpPr>
-            <p:cNvPr id="2" name="Rectangle 1">
-              <a:extLst>
-                <a:ext uri="{FF2B5EF4-FFF2-40B4-BE49-F238E27FC236}">
-                  <a16:creationId xmlns:a16="http://schemas.microsoft.com/office/drawing/2014/main" id="{C67C3BD8-0BED-9559-8087-C47983A75443}"/>
-                </a:ext>
-              </a:extLst>
-            </p:cNvPr>
-            <p:cNvSpPr/>
-            <p:nvPr/>
-          </p:nvSpPr>
-          <p:spPr>
-            <a:xfrm>
-              <a:off x="3238520" y="2455485"/>
-              <a:ext cx="2323184" cy="251334"/>
-            </a:xfrm>
-            <a:prstGeom prst="rect">
-              <a:avLst/>
-            </a:prstGeom>
-            <a:solidFill>
-              <a:srgbClr val="FFFF00">
-                <a:alpha val="34140"/>
-              </a:srgbClr>
-            </a:solidFill>
-            <a:ln>
-              <a:noFill/>
-            </a:ln>
-          </p:spPr>
-          <p:style>
-            <a:lnRef idx="2">
-              <a:schemeClr val="accent1">
-                <a:shade val="15000"/>
-              </a:schemeClr>
-            </a:lnRef>
-            <a:fillRef idx="1">
-              <a:schemeClr val="accent1"/>
-            </a:fillRef>
-            <a:effectRef idx="0">
-              <a:schemeClr val="accent1"/>
-            </a:effectRef>
-            <a:fontRef idx="minor">
-              <a:schemeClr val="lt1"/>
-            </a:fontRef>
-          </p:style>
-          <p:txBody>
-            <a:bodyPr rtlCol="0" anchor="ctr"/>
-            <a:lstStyle/>
-            <a:p>
-              <a:pPr algn="ctr"/>
-              <a:endParaRPr lang="en-US" dirty="0"/>
-            </a:p>
-          </p:txBody>
-        </p:sp>
-        <p:sp>
-          <p:nvSpPr>
-            <p:cNvPr id="4" name="Rectangle 3">
-              <a:extLst>
-                <a:ext uri="{FF2B5EF4-FFF2-40B4-BE49-F238E27FC236}">
-                  <a16:creationId xmlns:a16="http://schemas.microsoft.com/office/drawing/2014/main" id="{B6CFB71E-0571-E9B4-8CB3-8C2EC22EFB92}"/>
-                </a:ext>
-              </a:extLst>
-            </p:cNvPr>
-            <p:cNvSpPr/>
-            <p:nvPr/>
-          </p:nvSpPr>
-          <p:spPr>
-            <a:xfrm>
-              <a:off x="7578481" y="643381"/>
-              <a:ext cx="1974310" cy="82760"/>
-            </a:xfrm>
-            <a:prstGeom prst="rect">
-              <a:avLst/>
-            </a:prstGeom>
-            <a:solidFill>
-              <a:srgbClr val="FFFF00">
-                <a:alpha val="34140"/>
-              </a:srgbClr>
-            </a:solidFill>
-            <a:ln>
-              <a:noFill/>
-            </a:ln>
-          </p:spPr>
-          <p:style>
-            <a:lnRef idx="2">
-              <a:schemeClr val="accent1">
-                <a:shade val="15000"/>
-              </a:schemeClr>
-            </a:lnRef>
-            <a:fillRef idx="1">
-              <a:schemeClr val="accent1"/>
-            </a:fillRef>
-            <a:effectRef idx="0">
-              <a:schemeClr val="accent1"/>
-            </a:effectRef>
-            <a:fontRef idx="minor">
-              <a:schemeClr val="lt1"/>
-            </a:fontRef>
-          </p:style>
-          <p:txBody>
-            <a:bodyPr rtlCol="0" anchor="ctr"/>
-            <a:lstStyle/>
-            <a:p>
-              <a:pPr algn="ctr"/>
-              <a:endParaRPr lang="en-US" dirty="0"/>
-            </a:p>
-          </p:txBody>
-        </p:sp>
-        <p:sp>
-          <p:nvSpPr>
-            <p:cNvPr id="7" name="Rectangle 6">
-              <a:extLst>
-                <a:ext uri="{FF2B5EF4-FFF2-40B4-BE49-F238E27FC236}">
-                  <a16:creationId xmlns:a16="http://schemas.microsoft.com/office/drawing/2014/main" id="{2BC1DFC9-C191-01EB-1183-C31162129AEE}"/>
-                </a:ext>
-              </a:extLst>
-            </p:cNvPr>
-            <p:cNvSpPr/>
-            <p:nvPr/>
-          </p:nvSpPr>
-          <p:spPr>
-            <a:xfrm>
-              <a:off x="3238519" y="5000871"/>
-              <a:ext cx="2377489" cy="76738"/>
-            </a:xfrm>
-            <a:prstGeom prst="rect">
-              <a:avLst/>
-            </a:prstGeom>
-            <a:solidFill>
-              <a:srgbClr val="FFFF00">
-                <a:alpha val="34140"/>
-              </a:srgbClr>
-            </a:solidFill>
-            <a:ln>
-              <a:noFill/>
-            </a:ln>
-          </p:spPr>
-          <p:style>
-            <a:lnRef idx="2">
-              <a:schemeClr val="accent1">
-                <a:shade val="15000"/>
-              </a:schemeClr>
-            </a:lnRef>
-            <a:fillRef idx="1">
-              <a:schemeClr val="accent1"/>
-            </a:fillRef>
-            <a:effectRef idx="0">
-              <a:schemeClr val="accent1"/>
-            </a:effectRef>
-            <a:fontRef idx="minor">
-              <a:schemeClr val="lt1"/>
-            </a:fontRef>
-          </p:style>
-          <p:txBody>
-            <a:bodyPr rtlCol="0" anchor="ctr"/>
-            <a:lstStyle/>
-            <a:p>
-              <a:pPr algn="ctr"/>
-              <a:endParaRPr lang="en-US" dirty="0"/>
-            </a:p>
-          </p:txBody>
-        </p:sp>
-      </p:grpSp>
-    </p:spTree>
-    <p:extLst>
-      <p:ext uri="{BB962C8B-B14F-4D97-AF65-F5344CB8AC3E}">
-        <p14:creationId xmlns:p14="http://schemas.microsoft.com/office/powerpoint/2010/main" val="306529347"/>
       </p:ext>
     </p:extLst>
   </p:cSld>

</xml_diff>